<commit_message>
KEDA architecture should use "Kubernetes API Server"
Signed-off-by: Tom Kerkhove <kerkhove.tom@gmail.com>
</commit_message>
<xml_diff>
--- a/schematics.pptx
+++ b/schematics.pptx
@@ -104,6 +104,11 @@
       </a:defRPr>
     </a:lvl9pPr>
   </p:defaultTextStyle>
+  <p:extLst>
+    <p:ext uri="{EFAFB233-063F-42B5-8137-9DF3F51BA10A}">
+      <p15:sldGuideLst xmlns:p15="http://schemas.microsoft.com/office/powerpoint/2012/main"/>
+    </p:ext>
+  </p:extLst>
 </p:presentation>
 </file>
 
@@ -254,7 +259,7 @@
           <a:p>
             <a:fld id="{0E968EC0-D6D6-4282-ACBC-847D66F54BB0}" type="datetimeFigureOut">
               <a:rPr lang="en-US" smtClean="0"/>
-              <a:t>1/30/2020</a:t>
+              <a:t>4/9/2020</a:t>
             </a:fld>
             <a:endParaRPr lang="en-US"/>
           </a:p>
@@ -452,7 +457,7 @@
           <a:p>
             <a:fld id="{0E968EC0-D6D6-4282-ACBC-847D66F54BB0}" type="datetimeFigureOut">
               <a:rPr lang="en-US" smtClean="0"/>
-              <a:t>1/30/2020</a:t>
+              <a:t>4/9/2020</a:t>
             </a:fld>
             <a:endParaRPr lang="en-US"/>
           </a:p>
@@ -660,7 +665,7 @@
           <a:p>
             <a:fld id="{0E968EC0-D6D6-4282-ACBC-847D66F54BB0}" type="datetimeFigureOut">
               <a:rPr lang="en-US" smtClean="0"/>
-              <a:t>1/30/2020</a:t>
+              <a:t>4/9/2020</a:t>
             </a:fld>
             <a:endParaRPr lang="en-US"/>
           </a:p>
@@ -858,7 +863,7 @@
           <a:p>
             <a:fld id="{0E968EC0-D6D6-4282-ACBC-847D66F54BB0}" type="datetimeFigureOut">
               <a:rPr lang="en-US" smtClean="0"/>
-              <a:t>1/30/2020</a:t>
+              <a:t>4/9/2020</a:t>
             </a:fld>
             <a:endParaRPr lang="en-US"/>
           </a:p>
@@ -1133,7 +1138,7 @@
           <a:p>
             <a:fld id="{0E968EC0-D6D6-4282-ACBC-847D66F54BB0}" type="datetimeFigureOut">
               <a:rPr lang="en-US" smtClean="0"/>
-              <a:t>1/30/2020</a:t>
+              <a:t>4/9/2020</a:t>
             </a:fld>
             <a:endParaRPr lang="en-US"/>
           </a:p>
@@ -1398,7 +1403,7 @@
           <a:p>
             <a:fld id="{0E968EC0-D6D6-4282-ACBC-847D66F54BB0}" type="datetimeFigureOut">
               <a:rPr lang="en-US" smtClean="0"/>
-              <a:t>1/30/2020</a:t>
+              <a:t>4/9/2020</a:t>
             </a:fld>
             <a:endParaRPr lang="en-US"/>
           </a:p>
@@ -1810,7 +1815,7 @@
           <a:p>
             <a:fld id="{0E968EC0-D6D6-4282-ACBC-847D66F54BB0}" type="datetimeFigureOut">
               <a:rPr lang="en-US" smtClean="0"/>
-              <a:t>1/30/2020</a:t>
+              <a:t>4/9/2020</a:t>
             </a:fld>
             <a:endParaRPr lang="en-US"/>
           </a:p>
@@ -1951,7 +1956,7 @@
           <a:p>
             <a:fld id="{0E968EC0-D6D6-4282-ACBC-847D66F54BB0}" type="datetimeFigureOut">
               <a:rPr lang="en-US" smtClean="0"/>
-              <a:t>1/30/2020</a:t>
+              <a:t>4/9/2020</a:t>
             </a:fld>
             <a:endParaRPr lang="en-US"/>
           </a:p>
@@ -2064,7 +2069,7 @@
           <a:p>
             <a:fld id="{0E968EC0-D6D6-4282-ACBC-847D66F54BB0}" type="datetimeFigureOut">
               <a:rPr lang="en-US" smtClean="0"/>
-              <a:t>1/30/2020</a:t>
+              <a:t>4/9/2020</a:t>
             </a:fld>
             <a:endParaRPr lang="en-US"/>
           </a:p>
@@ -2375,7 +2380,7 @@
           <a:p>
             <a:fld id="{0E968EC0-D6D6-4282-ACBC-847D66F54BB0}" type="datetimeFigureOut">
               <a:rPr lang="en-US" smtClean="0"/>
-              <a:t>1/30/2020</a:t>
+              <a:t>4/9/2020</a:t>
             </a:fld>
             <a:endParaRPr lang="en-US"/>
           </a:p>
@@ -2663,7 +2668,7 @@
           <a:p>
             <a:fld id="{0E968EC0-D6D6-4282-ACBC-847D66F54BB0}" type="datetimeFigureOut">
               <a:rPr lang="en-US" smtClean="0"/>
-              <a:t>1/30/2020</a:t>
+              <a:t>4/9/2020</a:t>
             </a:fld>
             <a:endParaRPr lang="en-US"/>
           </a:p>
@@ -2904,7 +2909,7 @@
           <a:p>
             <a:fld id="{0E968EC0-D6D6-4282-ACBC-847D66F54BB0}" type="datetimeFigureOut">
               <a:rPr lang="en-US" smtClean="0"/>
-              <a:t>1/30/2020</a:t>
+              <a:t>4/9/2020</a:t>
             </a:fld>
             <a:endParaRPr lang="en-US"/>
           </a:p>
@@ -4141,7 +4146,32 @@
                   <a:latin typeface="Segoe UI Semibold" panose="020B0702040204020203" pitchFamily="34" charset="0"/>
                   <a:cs typeface="Segoe UI Semibold" panose="020B0702040204020203" pitchFamily="34" charset="0"/>
                 </a:rPr>
-                <a:t>Kubernetes store</a:t>
+                <a:t>Kubernetes</a:t>
+              </a:r>
+              <a:br>
+                <a:rPr lang="en-US" sz="1176" dirty="0">
+                  <a:ln w="3175">
+                    <a:noFill/>
+                  </a:ln>
+                  <a:solidFill>
+                    <a:srgbClr val="000000"/>
+                  </a:solidFill>
+                  <a:latin typeface="Segoe UI Semibold" panose="020B0702040204020203" pitchFamily="34" charset="0"/>
+                  <a:cs typeface="Segoe UI Semibold" panose="020B0702040204020203" pitchFamily="34" charset="0"/>
+                </a:rPr>
+              </a:br>
+              <a:r>
+                <a:rPr lang="en-US" sz="1176" dirty="0">
+                  <a:ln w="3175">
+                    <a:noFill/>
+                  </a:ln>
+                  <a:solidFill>
+                    <a:srgbClr val="000000"/>
+                  </a:solidFill>
+                  <a:latin typeface="Segoe UI Semibold" panose="020B0702040204020203" pitchFamily="34" charset="0"/>
+                  <a:cs typeface="Segoe UI Semibold" panose="020B0702040204020203" pitchFamily="34" charset="0"/>
+                </a:rPr>
+                <a:t>API Server</a:t>
               </a:r>
             </a:p>
           </p:txBody>
@@ -6856,6 +6886,24 @@
 </file>
 
 <file path=customXml/item1.xml><?xml version="1.0" encoding="utf-8"?>
+<p:properties xmlns:p="http://schemas.microsoft.com/office/2006/metadata/properties" xmlns:xsi="http://www.w3.org/2001/XMLSchema-instance" xmlns:pc="http://schemas.microsoft.com/office/infopath/2007/PartnerControls">
+  <documentManagement>
+    <_ip_UnifiedCompliancePolicyUIAction xmlns="http://schemas.microsoft.com/sharepoint/v3" xsi:nil="true"/>
+    <_ip_UnifiedCompliancePolicyProperties xmlns="http://schemas.microsoft.com/sharepoint/v3" xsi:nil="true"/>
+  </documentManagement>
+</p:properties>
+</file>
+
+<file path=customXml/item2.xml><?xml version="1.0" encoding="utf-8"?>
+<?mso-contentType ?>
+<FormTemplates xmlns="http://schemas.microsoft.com/sharepoint/v3/contenttype/forms">
+  <Display>DocumentLibraryForm</Display>
+  <Edit>DocumentLibraryForm</Edit>
+  <New>DocumentLibraryForm</New>
+</FormTemplates>
+</file>
+
+<file path=customXml/item3.xml><?xml version="1.0" encoding="utf-8"?>
 <ct:contentTypeSchema xmlns:ct="http://schemas.microsoft.com/office/2006/metadata/contentType" xmlns:ma="http://schemas.microsoft.com/office/2006/metadata/properties/metaAttributes" ct:_="" ma:_="" ma:contentTypeName="Document" ma:contentTypeID="0x01010070F764BEC1B1594BA671F7EDF2C48406" ma:contentTypeVersion="16" ma:contentTypeDescription="Create a new document." ma:contentTypeScope="" ma:versionID="a0b1923196e71502b75788a119d078f9">
   <xsd:schema xmlns:xsd="http://www.w3.org/2001/XMLSchema" xmlns:xs="http://www.w3.org/2001/XMLSchema" xmlns:p="http://schemas.microsoft.com/office/2006/metadata/properties" xmlns:ns1="http://schemas.microsoft.com/sharepoint/v3" xmlns:ns3="8ded309d-af83-4345-8f5a-4616d915c192" xmlns:ns4="4cfcf085-b638-4b59-b50a-d14883d72e15" targetNamespace="http://schemas.microsoft.com/office/2006/metadata/properties" ma:root="true" ma:fieldsID="00c7a68b45329ff3d3ae1418d55c56ea" ns1:_="" ns3:_="" ns4:_="">
     <xsd:import namespace="http://schemas.microsoft.com/sharepoint/v3"/>
@@ -7103,25 +7151,25 @@
 </ct:contentTypeSchema>
 </file>
 
-<file path=customXml/item2.xml><?xml version="1.0" encoding="utf-8"?>
-<?mso-contentType ?>
-<FormTemplates xmlns="http://schemas.microsoft.com/sharepoint/v3/contenttype/forms">
-  <Display>DocumentLibraryForm</Display>
-  <Edit>DocumentLibraryForm</Edit>
-  <New>DocumentLibraryForm</New>
-</FormTemplates>
+<file path=customXml/itemProps1.xml><?xml version="1.0" encoding="utf-8"?>
+<ds:datastoreItem xmlns:ds="http://schemas.openxmlformats.org/officeDocument/2006/customXml" ds:itemID="{562AB0D4-9C13-4289-B04F-FD9456E84705}">
+  <ds:schemaRefs>
+    <ds:schemaRef ds:uri="http://schemas.microsoft.com/office/2006/metadata/properties"/>
+    <ds:schemaRef ds:uri="http://schemas.microsoft.com/office/infopath/2007/PartnerControls"/>
+    <ds:schemaRef ds:uri="http://schemas.microsoft.com/sharepoint/v3"/>
+  </ds:schemaRefs>
+</ds:datastoreItem>
 </file>
 
-<file path=customXml/item3.xml><?xml version="1.0" encoding="utf-8"?>
-<p:properties xmlns:p="http://schemas.microsoft.com/office/2006/metadata/properties" xmlns:xsi="http://www.w3.org/2001/XMLSchema-instance" xmlns:pc="http://schemas.microsoft.com/office/infopath/2007/PartnerControls">
-  <documentManagement>
-    <_ip_UnifiedCompliancePolicyUIAction xmlns="http://schemas.microsoft.com/sharepoint/v3" xsi:nil="true"/>
-    <_ip_UnifiedCompliancePolicyProperties xmlns="http://schemas.microsoft.com/sharepoint/v3" xsi:nil="true"/>
-  </documentManagement>
-</p:properties>
+<file path=customXml/itemProps2.xml><?xml version="1.0" encoding="utf-8"?>
+<ds:datastoreItem xmlns:ds="http://schemas.openxmlformats.org/officeDocument/2006/customXml" ds:itemID="{03A7A0CD-F183-45F4-8712-6A759435F0D6}">
+  <ds:schemaRefs>
+    <ds:schemaRef ds:uri="http://schemas.microsoft.com/sharepoint/v3/contenttype/forms"/>
+  </ds:schemaRefs>
+</ds:datastoreItem>
 </file>
 
-<file path=customXml/itemProps1.xml><?xml version="1.0" encoding="utf-8"?>
+<file path=customXml/itemProps3.xml><?xml version="1.0" encoding="utf-8"?>
 <ds:datastoreItem xmlns:ds="http://schemas.openxmlformats.org/officeDocument/2006/customXml" ds:itemID="{117D3023-BF87-4919-A41A-B9DB292F07A9}">
   <ds:schemaRefs>
     <ds:schemaRef ds:uri="http://schemas.microsoft.com/office/2006/metadata/contentType"/>
@@ -7139,22 +7187,4 @@
     <ds:schemaRef ds:uri="http://schemas.microsoft.com/internal/obd"/>
   </ds:schemaRefs>
 </ds:datastoreItem>
-</file>
-
-<file path=customXml/itemProps2.xml><?xml version="1.0" encoding="utf-8"?>
-<ds:datastoreItem xmlns:ds="http://schemas.openxmlformats.org/officeDocument/2006/customXml" ds:itemID="{03A7A0CD-F183-45F4-8712-6A759435F0D6}">
-  <ds:schemaRefs>
-    <ds:schemaRef ds:uri="http://schemas.microsoft.com/sharepoint/v3/contenttype/forms"/>
-  </ds:schemaRefs>
-</ds:datastoreItem>
-</file>
-
-<file path=customXml/itemProps3.xml><?xml version="1.0" encoding="utf-8"?>
-<ds:datastoreItem xmlns:ds="http://schemas.openxmlformats.org/officeDocument/2006/customXml" ds:itemID="{562AB0D4-9C13-4289-B04F-FD9456E84705}">
-  <ds:schemaRefs>
-    <ds:schemaRef ds:uri="http://schemas.microsoft.com/office/2006/metadata/properties"/>
-    <ds:schemaRef ds:uri="http://schemas.microsoft.com/office/infopath/2007/PartnerControls"/>
-    <ds:schemaRef ds:uri="http://schemas.microsoft.com/sharepoint/v3"/>
-  </ds:schemaRefs>
-</ds:datastoreItem>
 </file>
</xml_diff>

<commit_message>
Use gray instead of blue
Signed-off-by: Tom Kerkhove <kerkhove.tom@gmail.com>
</commit_message>
<xml_diff>
--- a/schematics.pptx
+++ b/schematics.pptx
@@ -4805,24 +4805,24 @@
                 <a:avLst/>
               </a:prstGeom>
               <a:solidFill>
-                <a:schemeClr val="accent1"/>
+                <a:schemeClr val="accent3">
+                  <a:lumMod val="40000"/>
+                  <a:lumOff val="60000"/>
+                </a:schemeClr>
               </a:solidFill>
               <a:ln>
                 <a:noFill/>
-                <a:headEnd type="none" w="med" len="med"/>
-                <a:tailEnd type="none" w="med" len="med"/>
               </a:ln>
-              <a:effectLst/>
             </p:spPr>
             <p:style>
-              <a:lnRef idx="1">
-                <a:schemeClr val="accent2"/>
+              <a:lnRef idx="0">
+                <a:scrgbClr r="0" g="0" b="0"/>
               </a:lnRef>
-              <a:fillRef idx="3">
-                <a:schemeClr val="accent2"/>
+              <a:fillRef idx="0">
+                <a:scrgbClr r="0" g="0" b="0"/>
               </a:fillRef>
-              <a:effectRef idx="2">
-                <a:schemeClr val="accent2"/>
+              <a:effectRef idx="0">
+                <a:scrgbClr r="0" g="0" b="0"/>
               </a:effectRef>
               <a:fontRef idx="minor">
                 <a:schemeClr val="lt1"/>
@@ -6197,24 +6197,24 @@
                 <a:avLst/>
               </a:prstGeom>
               <a:solidFill>
-                <a:schemeClr val="accent1"/>
+                <a:schemeClr val="accent3">
+                  <a:lumMod val="40000"/>
+                  <a:lumOff val="60000"/>
+                </a:schemeClr>
               </a:solidFill>
               <a:ln>
                 <a:noFill/>
-                <a:headEnd type="none" w="med" len="med"/>
-                <a:tailEnd type="none" w="med" len="med"/>
               </a:ln>
-              <a:effectLst/>
             </p:spPr>
             <p:style>
-              <a:lnRef idx="1">
-                <a:schemeClr val="accent2"/>
+              <a:lnRef idx="0">
+                <a:scrgbClr r="0" g="0" b="0"/>
               </a:lnRef>
-              <a:fillRef idx="3">
-                <a:schemeClr val="accent2"/>
+              <a:fillRef idx="0">
+                <a:scrgbClr r="0" g="0" b="0"/>
               </a:fillRef>
-              <a:effectRef idx="2">
-                <a:schemeClr val="accent2"/>
+              <a:effectRef idx="0">
+                <a:scrgbClr r="0" g="0" b="0"/>
               </a:effectRef>
               <a:fontRef idx="minor">
                 <a:schemeClr val="lt1"/>
@@ -6252,7 +6252,6 @@
                     </a:gsLst>
                     <a:lin ang="5400000" scaled="0"/>
                   </a:gradFill>
-                  <a:ea typeface="Segoe UI" pitchFamily="34" charset="0"/>
                   <a:cs typeface="Segoe UI" pitchFamily="34" charset="0"/>
                 </a:endParaRPr>
               </a:p>
@@ -6886,24 +6885,6 @@
 </file>
 
 <file path=customXml/item1.xml><?xml version="1.0" encoding="utf-8"?>
-<p:properties xmlns:p="http://schemas.microsoft.com/office/2006/metadata/properties" xmlns:xsi="http://www.w3.org/2001/XMLSchema-instance" xmlns:pc="http://schemas.microsoft.com/office/infopath/2007/PartnerControls">
-  <documentManagement>
-    <_ip_UnifiedCompliancePolicyUIAction xmlns="http://schemas.microsoft.com/sharepoint/v3" xsi:nil="true"/>
-    <_ip_UnifiedCompliancePolicyProperties xmlns="http://schemas.microsoft.com/sharepoint/v3" xsi:nil="true"/>
-  </documentManagement>
-</p:properties>
-</file>
-
-<file path=customXml/item2.xml><?xml version="1.0" encoding="utf-8"?>
-<?mso-contentType ?>
-<FormTemplates xmlns="http://schemas.microsoft.com/sharepoint/v3/contenttype/forms">
-  <Display>DocumentLibraryForm</Display>
-  <Edit>DocumentLibraryForm</Edit>
-  <New>DocumentLibraryForm</New>
-</FormTemplates>
-</file>
-
-<file path=customXml/item3.xml><?xml version="1.0" encoding="utf-8"?>
 <ct:contentTypeSchema xmlns:ct="http://schemas.microsoft.com/office/2006/metadata/contentType" xmlns:ma="http://schemas.microsoft.com/office/2006/metadata/properties/metaAttributes" ct:_="" ma:_="" ma:contentTypeName="Document" ma:contentTypeID="0x01010070F764BEC1B1594BA671F7EDF2C48406" ma:contentTypeVersion="16" ma:contentTypeDescription="Create a new document." ma:contentTypeScope="" ma:versionID="a0b1923196e71502b75788a119d078f9">
   <xsd:schema xmlns:xsd="http://www.w3.org/2001/XMLSchema" xmlns:xs="http://www.w3.org/2001/XMLSchema" xmlns:p="http://schemas.microsoft.com/office/2006/metadata/properties" xmlns:ns1="http://schemas.microsoft.com/sharepoint/v3" xmlns:ns3="8ded309d-af83-4345-8f5a-4616d915c192" xmlns:ns4="4cfcf085-b638-4b59-b50a-d14883d72e15" targetNamespace="http://schemas.microsoft.com/office/2006/metadata/properties" ma:root="true" ma:fieldsID="00c7a68b45329ff3d3ae1418d55c56ea" ns1:_="" ns3:_="" ns4:_="">
     <xsd:import namespace="http://schemas.microsoft.com/sharepoint/v3"/>
@@ -7151,25 +7132,25 @@
 </ct:contentTypeSchema>
 </file>
 
-<file path=customXml/itemProps1.xml><?xml version="1.0" encoding="utf-8"?>
-<ds:datastoreItem xmlns:ds="http://schemas.openxmlformats.org/officeDocument/2006/customXml" ds:itemID="{562AB0D4-9C13-4289-B04F-FD9456E84705}">
-  <ds:schemaRefs>
-    <ds:schemaRef ds:uri="http://schemas.microsoft.com/office/2006/metadata/properties"/>
-    <ds:schemaRef ds:uri="http://schemas.microsoft.com/office/infopath/2007/PartnerControls"/>
-    <ds:schemaRef ds:uri="http://schemas.microsoft.com/sharepoint/v3"/>
-  </ds:schemaRefs>
-</ds:datastoreItem>
+<file path=customXml/item2.xml><?xml version="1.0" encoding="utf-8"?>
+<?mso-contentType ?>
+<FormTemplates xmlns="http://schemas.microsoft.com/sharepoint/v3/contenttype/forms">
+  <Display>DocumentLibraryForm</Display>
+  <Edit>DocumentLibraryForm</Edit>
+  <New>DocumentLibraryForm</New>
+</FormTemplates>
 </file>
 
-<file path=customXml/itemProps2.xml><?xml version="1.0" encoding="utf-8"?>
-<ds:datastoreItem xmlns:ds="http://schemas.openxmlformats.org/officeDocument/2006/customXml" ds:itemID="{03A7A0CD-F183-45F4-8712-6A759435F0D6}">
-  <ds:schemaRefs>
-    <ds:schemaRef ds:uri="http://schemas.microsoft.com/sharepoint/v3/contenttype/forms"/>
-  </ds:schemaRefs>
-</ds:datastoreItem>
+<file path=customXml/item3.xml><?xml version="1.0" encoding="utf-8"?>
+<p:properties xmlns:p="http://schemas.microsoft.com/office/2006/metadata/properties" xmlns:xsi="http://www.w3.org/2001/XMLSchema-instance" xmlns:pc="http://schemas.microsoft.com/office/infopath/2007/PartnerControls">
+  <documentManagement>
+    <_ip_UnifiedCompliancePolicyUIAction xmlns="http://schemas.microsoft.com/sharepoint/v3" xsi:nil="true"/>
+    <_ip_UnifiedCompliancePolicyProperties xmlns="http://schemas.microsoft.com/sharepoint/v3" xsi:nil="true"/>
+  </documentManagement>
+</p:properties>
 </file>
 
-<file path=customXml/itemProps3.xml><?xml version="1.0" encoding="utf-8"?>
+<file path=customXml/itemProps1.xml><?xml version="1.0" encoding="utf-8"?>
 <ds:datastoreItem xmlns:ds="http://schemas.openxmlformats.org/officeDocument/2006/customXml" ds:itemID="{117D3023-BF87-4919-A41A-B9DB292F07A9}">
   <ds:schemaRefs>
     <ds:schemaRef ds:uri="http://schemas.microsoft.com/office/2006/metadata/contentType"/>
@@ -7187,4 +7168,22 @@
     <ds:schemaRef ds:uri="http://schemas.microsoft.com/internal/obd"/>
   </ds:schemaRefs>
 </ds:datastoreItem>
+</file>
+
+<file path=customXml/itemProps2.xml><?xml version="1.0" encoding="utf-8"?>
+<ds:datastoreItem xmlns:ds="http://schemas.openxmlformats.org/officeDocument/2006/customXml" ds:itemID="{03A7A0CD-F183-45F4-8712-6A759435F0D6}">
+  <ds:schemaRefs>
+    <ds:schemaRef ds:uri="http://schemas.microsoft.com/sharepoint/v3/contenttype/forms"/>
+  </ds:schemaRefs>
+</ds:datastoreItem>
+</file>
+
+<file path=customXml/itemProps3.xml><?xml version="1.0" encoding="utf-8"?>
+<ds:datastoreItem xmlns:ds="http://schemas.openxmlformats.org/officeDocument/2006/customXml" ds:itemID="{562AB0D4-9C13-4289-B04F-FD9456E84705}">
+  <ds:schemaRefs>
+    <ds:schemaRef ds:uri="http://schemas.microsoft.com/office/2006/metadata/properties"/>
+    <ds:schemaRef ds:uri="http://schemas.microsoft.com/office/infopath/2007/PartnerControls"/>
+    <ds:schemaRef ds:uri="http://schemas.microsoft.com/sharepoint/v3"/>
+  </ds:schemaRefs>
+</ds:datastoreItem>
 </file>
</xml_diff>

<commit_message>
KEDA architecture should use "Kubernetes API Server" (#141)
* KEDA architecture should use "Kubernetes API Server"

Signed-off-by: Tom Kerkhove <kerkhove.tom@gmail.com>

* Use gray instead of blue

Signed-off-by: Tom Kerkhove <kerkhove.tom@gmail.com>
</commit_message>
<xml_diff>
--- a/schematics.pptx
+++ b/schematics.pptx
@@ -104,6 +104,11 @@
       </a:defRPr>
     </a:lvl9pPr>
   </p:defaultTextStyle>
+  <p:extLst>
+    <p:ext uri="{EFAFB233-063F-42B5-8137-9DF3F51BA10A}">
+      <p15:sldGuideLst xmlns:p15="http://schemas.microsoft.com/office/powerpoint/2012/main"/>
+    </p:ext>
+  </p:extLst>
 </p:presentation>
 </file>
 
@@ -254,7 +259,7 @@
           <a:p>
             <a:fld id="{0E968EC0-D6D6-4282-ACBC-847D66F54BB0}" type="datetimeFigureOut">
               <a:rPr lang="en-US" smtClean="0"/>
-              <a:t>1/30/2020</a:t>
+              <a:t>4/9/2020</a:t>
             </a:fld>
             <a:endParaRPr lang="en-US"/>
           </a:p>
@@ -452,7 +457,7 @@
           <a:p>
             <a:fld id="{0E968EC0-D6D6-4282-ACBC-847D66F54BB0}" type="datetimeFigureOut">
               <a:rPr lang="en-US" smtClean="0"/>
-              <a:t>1/30/2020</a:t>
+              <a:t>4/9/2020</a:t>
             </a:fld>
             <a:endParaRPr lang="en-US"/>
           </a:p>
@@ -660,7 +665,7 @@
           <a:p>
             <a:fld id="{0E968EC0-D6D6-4282-ACBC-847D66F54BB0}" type="datetimeFigureOut">
               <a:rPr lang="en-US" smtClean="0"/>
-              <a:t>1/30/2020</a:t>
+              <a:t>4/9/2020</a:t>
             </a:fld>
             <a:endParaRPr lang="en-US"/>
           </a:p>
@@ -858,7 +863,7 @@
           <a:p>
             <a:fld id="{0E968EC0-D6D6-4282-ACBC-847D66F54BB0}" type="datetimeFigureOut">
               <a:rPr lang="en-US" smtClean="0"/>
-              <a:t>1/30/2020</a:t>
+              <a:t>4/9/2020</a:t>
             </a:fld>
             <a:endParaRPr lang="en-US"/>
           </a:p>
@@ -1133,7 +1138,7 @@
           <a:p>
             <a:fld id="{0E968EC0-D6D6-4282-ACBC-847D66F54BB0}" type="datetimeFigureOut">
               <a:rPr lang="en-US" smtClean="0"/>
-              <a:t>1/30/2020</a:t>
+              <a:t>4/9/2020</a:t>
             </a:fld>
             <a:endParaRPr lang="en-US"/>
           </a:p>
@@ -1398,7 +1403,7 @@
           <a:p>
             <a:fld id="{0E968EC0-D6D6-4282-ACBC-847D66F54BB0}" type="datetimeFigureOut">
               <a:rPr lang="en-US" smtClean="0"/>
-              <a:t>1/30/2020</a:t>
+              <a:t>4/9/2020</a:t>
             </a:fld>
             <a:endParaRPr lang="en-US"/>
           </a:p>
@@ -1810,7 +1815,7 @@
           <a:p>
             <a:fld id="{0E968EC0-D6D6-4282-ACBC-847D66F54BB0}" type="datetimeFigureOut">
               <a:rPr lang="en-US" smtClean="0"/>
-              <a:t>1/30/2020</a:t>
+              <a:t>4/9/2020</a:t>
             </a:fld>
             <a:endParaRPr lang="en-US"/>
           </a:p>
@@ -1951,7 +1956,7 @@
           <a:p>
             <a:fld id="{0E968EC0-D6D6-4282-ACBC-847D66F54BB0}" type="datetimeFigureOut">
               <a:rPr lang="en-US" smtClean="0"/>
-              <a:t>1/30/2020</a:t>
+              <a:t>4/9/2020</a:t>
             </a:fld>
             <a:endParaRPr lang="en-US"/>
           </a:p>
@@ -2064,7 +2069,7 @@
           <a:p>
             <a:fld id="{0E968EC0-D6D6-4282-ACBC-847D66F54BB0}" type="datetimeFigureOut">
               <a:rPr lang="en-US" smtClean="0"/>
-              <a:t>1/30/2020</a:t>
+              <a:t>4/9/2020</a:t>
             </a:fld>
             <a:endParaRPr lang="en-US"/>
           </a:p>
@@ -2375,7 +2380,7 @@
           <a:p>
             <a:fld id="{0E968EC0-D6D6-4282-ACBC-847D66F54BB0}" type="datetimeFigureOut">
               <a:rPr lang="en-US" smtClean="0"/>
-              <a:t>1/30/2020</a:t>
+              <a:t>4/9/2020</a:t>
             </a:fld>
             <a:endParaRPr lang="en-US"/>
           </a:p>
@@ -2663,7 +2668,7 @@
           <a:p>
             <a:fld id="{0E968EC0-D6D6-4282-ACBC-847D66F54BB0}" type="datetimeFigureOut">
               <a:rPr lang="en-US" smtClean="0"/>
-              <a:t>1/30/2020</a:t>
+              <a:t>4/9/2020</a:t>
             </a:fld>
             <a:endParaRPr lang="en-US"/>
           </a:p>
@@ -2904,7 +2909,7 @@
           <a:p>
             <a:fld id="{0E968EC0-D6D6-4282-ACBC-847D66F54BB0}" type="datetimeFigureOut">
               <a:rPr lang="en-US" smtClean="0"/>
-              <a:t>1/30/2020</a:t>
+              <a:t>4/9/2020</a:t>
             </a:fld>
             <a:endParaRPr lang="en-US"/>
           </a:p>
@@ -4141,7 +4146,32 @@
                   <a:latin typeface="Segoe UI Semibold" panose="020B0702040204020203" pitchFamily="34" charset="0"/>
                   <a:cs typeface="Segoe UI Semibold" panose="020B0702040204020203" pitchFamily="34" charset="0"/>
                 </a:rPr>
-                <a:t>Kubernetes store</a:t>
+                <a:t>Kubernetes</a:t>
+              </a:r>
+              <a:br>
+                <a:rPr lang="en-US" sz="1176" dirty="0">
+                  <a:ln w="3175">
+                    <a:noFill/>
+                  </a:ln>
+                  <a:solidFill>
+                    <a:srgbClr val="000000"/>
+                  </a:solidFill>
+                  <a:latin typeface="Segoe UI Semibold" panose="020B0702040204020203" pitchFamily="34" charset="0"/>
+                  <a:cs typeface="Segoe UI Semibold" panose="020B0702040204020203" pitchFamily="34" charset="0"/>
+                </a:rPr>
+              </a:br>
+              <a:r>
+                <a:rPr lang="en-US" sz="1176" dirty="0">
+                  <a:ln w="3175">
+                    <a:noFill/>
+                  </a:ln>
+                  <a:solidFill>
+                    <a:srgbClr val="000000"/>
+                  </a:solidFill>
+                  <a:latin typeface="Segoe UI Semibold" panose="020B0702040204020203" pitchFamily="34" charset="0"/>
+                  <a:cs typeface="Segoe UI Semibold" panose="020B0702040204020203" pitchFamily="34" charset="0"/>
+                </a:rPr>
+                <a:t>API Server</a:t>
               </a:r>
             </a:p>
           </p:txBody>
@@ -4775,24 +4805,24 @@
                 <a:avLst/>
               </a:prstGeom>
               <a:solidFill>
-                <a:schemeClr val="accent1"/>
+                <a:schemeClr val="accent3">
+                  <a:lumMod val="40000"/>
+                  <a:lumOff val="60000"/>
+                </a:schemeClr>
               </a:solidFill>
               <a:ln>
                 <a:noFill/>
-                <a:headEnd type="none" w="med" len="med"/>
-                <a:tailEnd type="none" w="med" len="med"/>
               </a:ln>
-              <a:effectLst/>
             </p:spPr>
             <p:style>
-              <a:lnRef idx="1">
-                <a:schemeClr val="accent2"/>
+              <a:lnRef idx="0">
+                <a:scrgbClr r="0" g="0" b="0"/>
               </a:lnRef>
-              <a:fillRef idx="3">
-                <a:schemeClr val="accent2"/>
+              <a:fillRef idx="0">
+                <a:scrgbClr r="0" g="0" b="0"/>
               </a:fillRef>
-              <a:effectRef idx="2">
-                <a:schemeClr val="accent2"/>
+              <a:effectRef idx="0">
+                <a:scrgbClr r="0" g="0" b="0"/>
               </a:effectRef>
               <a:fontRef idx="minor">
                 <a:schemeClr val="lt1"/>
@@ -6167,24 +6197,24 @@
                 <a:avLst/>
               </a:prstGeom>
               <a:solidFill>
-                <a:schemeClr val="accent1"/>
+                <a:schemeClr val="accent3">
+                  <a:lumMod val="40000"/>
+                  <a:lumOff val="60000"/>
+                </a:schemeClr>
               </a:solidFill>
               <a:ln>
                 <a:noFill/>
-                <a:headEnd type="none" w="med" len="med"/>
-                <a:tailEnd type="none" w="med" len="med"/>
               </a:ln>
-              <a:effectLst/>
             </p:spPr>
             <p:style>
-              <a:lnRef idx="1">
-                <a:schemeClr val="accent2"/>
+              <a:lnRef idx="0">
+                <a:scrgbClr r="0" g="0" b="0"/>
               </a:lnRef>
-              <a:fillRef idx="3">
-                <a:schemeClr val="accent2"/>
+              <a:fillRef idx="0">
+                <a:scrgbClr r="0" g="0" b="0"/>
               </a:fillRef>
-              <a:effectRef idx="2">
-                <a:schemeClr val="accent2"/>
+              <a:effectRef idx="0">
+                <a:scrgbClr r="0" g="0" b="0"/>
               </a:effectRef>
               <a:fontRef idx="minor">
                 <a:schemeClr val="lt1"/>
@@ -6222,7 +6252,6 @@
                     </a:gsLst>
                     <a:lin ang="5400000" scaled="0"/>
                   </a:gradFill>
-                  <a:ea typeface="Segoe UI" pitchFamily="34" charset="0"/>
                   <a:cs typeface="Segoe UI" pitchFamily="34" charset="0"/>
                 </a:endParaRPr>
               </a:p>

</xml_diff>